<commit_message>
Recent changes o PPT by added new slides
</commit_message>
<xml_diff>
--- a/400 Presentation.pptx
+++ b/400 Presentation.pptx
@@ -11,13 +11,14 @@
     <p:sldId id="261" r:id="rId5"/>
     <p:sldId id="258" r:id="rId6"/>
     <p:sldId id="262" r:id="rId7"/>
-    <p:sldId id="257" r:id="rId8"/>
-    <p:sldId id="268" r:id="rId9"/>
-    <p:sldId id="263" r:id="rId10"/>
-    <p:sldId id="265" r:id="rId11"/>
-    <p:sldId id="266" r:id="rId12"/>
-    <p:sldId id="267" r:id="rId13"/>
-    <p:sldId id="264" r:id="rId14"/>
+    <p:sldId id="269" r:id="rId8"/>
+    <p:sldId id="257" r:id="rId9"/>
+    <p:sldId id="268" r:id="rId10"/>
+    <p:sldId id="263" r:id="rId11"/>
+    <p:sldId id="265" r:id="rId12"/>
+    <p:sldId id="266" r:id="rId13"/>
+    <p:sldId id="267" r:id="rId14"/>
+    <p:sldId id="264" r:id="rId15"/>
   </p:sldIdLst>
   <p:sldSz cx="12192000" cy="6858000"/>
   <p:notesSz cx="6858000" cy="9144000"/>
@@ -627,7 +628,7 @@
           <a:p>
             <a:fld id="{4A012FA5-57F2-4E13-B123-5C8D89215D5E}" type="datetimeFigureOut">
               <a:rPr lang="en-US" smtClean="0"/>
-              <a:t>12/8/2021</a:t>
+              <a:t>12/9/2021</a:t>
             </a:fld>
             <a:endParaRPr lang="en-US"/>
           </a:p>
@@ -825,7 +826,7 @@
           <a:p>
             <a:fld id="{4A012FA5-57F2-4E13-B123-5C8D89215D5E}" type="datetimeFigureOut">
               <a:rPr lang="en-US" smtClean="0"/>
-              <a:t>12/8/2021</a:t>
+              <a:t>12/9/2021</a:t>
             </a:fld>
             <a:endParaRPr lang="en-US"/>
           </a:p>
@@ -1033,7 +1034,7 @@
           <a:p>
             <a:fld id="{4A012FA5-57F2-4E13-B123-5C8D89215D5E}" type="datetimeFigureOut">
               <a:rPr lang="en-US" smtClean="0"/>
-              <a:t>12/8/2021</a:t>
+              <a:t>12/9/2021</a:t>
             </a:fld>
             <a:endParaRPr lang="en-US"/>
           </a:p>
@@ -1231,7 +1232,7 @@
           <a:p>
             <a:fld id="{4A012FA5-57F2-4E13-B123-5C8D89215D5E}" type="datetimeFigureOut">
               <a:rPr lang="en-US" smtClean="0"/>
-              <a:t>12/8/2021</a:t>
+              <a:t>12/9/2021</a:t>
             </a:fld>
             <a:endParaRPr lang="en-US"/>
           </a:p>
@@ -1506,7 +1507,7 @@
           <a:p>
             <a:fld id="{4A012FA5-57F2-4E13-B123-5C8D89215D5E}" type="datetimeFigureOut">
               <a:rPr lang="en-US" smtClean="0"/>
-              <a:t>12/8/2021</a:t>
+              <a:t>12/9/2021</a:t>
             </a:fld>
             <a:endParaRPr lang="en-US"/>
           </a:p>
@@ -1771,7 +1772,7 @@
           <a:p>
             <a:fld id="{4A012FA5-57F2-4E13-B123-5C8D89215D5E}" type="datetimeFigureOut">
               <a:rPr lang="en-US" smtClean="0"/>
-              <a:t>12/8/2021</a:t>
+              <a:t>12/9/2021</a:t>
             </a:fld>
             <a:endParaRPr lang="en-US"/>
           </a:p>
@@ -2183,7 +2184,7 @@
           <a:p>
             <a:fld id="{4A012FA5-57F2-4E13-B123-5C8D89215D5E}" type="datetimeFigureOut">
               <a:rPr lang="en-US" smtClean="0"/>
-              <a:t>12/8/2021</a:t>
+              <a:t>12/9/2021</a:t>
             </a:fld>
             <a:endParaRPr lang="en-US"/>
           </a:p>
@@ -2324,7 +2325,7 @@
           <a:p>
             <a:fld id="{4A012FA5-57F2-4E13-B123-5C8D89215D5E}" type="datetimeFigureOut">
               <a:rPr lang="en-US" smtClean="0"/>
-              <a:t>12/8/2021</a:t>
+              <a:t>12/9/2021</a:t>
             </a:fld>
             <a:endParaRPr lang="en-US"/>
           </a:p>
@@ -2437,7 +2438,7 @@
           <a:p>
             <a:fld id="{4A012FA5-57F2-4E13-B123-5C8D89215D5E}" type="datetimeFigureOut">
               <a:rPr lang="en-US" smtClean="0"/>
-              <a:t>12/8/2021</a:t>
+              <a:t>12/9/2021</a:t>
             </a:fld>
             <a:endParaRPr lang="en-US"/>
           </a:p>
@@ -2748,7 +2749,7 @@
           <a:p>
             <a:fld id="{4A012FA5-57F2-4E13-B123-5C8D89215D5E}" type="datetimeFigureOut">
               <a:rPr lang="en-US" smtClean="0"/>
-              <a:t>12/8/2021</a:t>
+              <a:t>12/9/2021</a:t>
             </a:fld>
             <a:endParaRPr lang="en-US"/>
           </a:p>
@@ -3036,7 +3037,7 @@
           <a:p>
             <a:fld id="{4A012FA5-57F2-4E13-B123-5C8D89215D5E}" type="datetimeFigureOut">
               <a:rPr lang="en-US" smtClean="0"/>
-              <a:t>12/8/2021</a:t>
+              <a:t>12/9/2021</a:t>
             </a:fld>
             <a:endParaRPr lang="en-US"/>
           </a:p>
@@ -3277,7 +3278,7 @@
           <a:p>
             <a:fld id="{4A012FA5-57F2-4E13-B123-5C8D89215D5E}" type="datetimeFigureOut">
               <a:rPr lang="en-US" smtClean="0"/>
-              <a:t>12/8/2021</a:t>
+              <a:t>12/9/2021</a:t>
             </a:fld>
             <a:endParaRPr lang="en-US"/>
           </a:p>
@@ -3790,7 +3791,7 @@
           <p:cNvPr id="2" name="Title 1">
             <a:extLst>
               <a:ext uri="{FF2B5EF4-FFF2-40B4-BE49-F238E27FC236}">
-                <a16:creationId xmlns:a16="http://schemas.microsoft.com/office/drawing/2014/main" id="{AAD67D5E-5D5C-4328-A672-6942E13EA394}"/>
+                <a16:creationId xmlns:a16="http://schemas.microsoft.com/office/drawing/2014/main" id="{E901A6C3-F72A-497A-8E3E-CEF2E243711C}"/>
               </a:ext>
             </a:extLst>
           </p:cNvPr>
@@ -3808,57 +3809,99 @@
           <a:p>
             <a:r>
               <a:rPr lang="en-US" dirty="0"/>
-              <a:t>Bootstrap Sampling</a:t>
-            </a:r>
-          </a:p>
-        </p:txBody>
-      </p:sp>
-      <p:sp>
-        <p:nvSpPr>
-          <p:cNvPr id="3" name="Content Placeholder 2">
-            <a:extLst>
-              <a:ext uri="{FF2B5EF4-FFF2-40B4-BE49-F238E27FC236}">
-                <a16:creationId xmlns:a16="http://schemas.microsoft.com/office/drawing/2014/main" id="{BCDBEC09-12C4-4523-9DB1-90D0E2CF9F1B}"/>
-              </a:ext>
-            </a:extLst>
-          </p:cNvPr>
-          <p:cNvSpPr>
-            <a:spLocks noGrp="1"/>
-          </p:cNvSpPr>
+              <a:t>Two-Sample T Test Results</a:t>
+            </a:r>
+          </a:p>
+        </p:txBody>
+      </p:sp>
+      <p:pic>
+        <p:nvPicPr>
+          <p:cNvPr id="6" name="Content Placeholder 5" descr="Text, letter&#10;&#10;Description automatically generated">
+            <a:extLst>
+              <a:ext uri="{FF2B5EF4-FFF2-40B4-BE49-F238E27FC236}">
+                <a16:creationId xmlns:a16="http://schemas.microsoft.com/office/drawing/2014/main" id="{0CAA84E1-555A-4572-936B-19299817F9C9}"/>
+              </a:ext>
+            </a:extLst>
+          </p:cNvPr>
+          <p:cNvPicPr>
+            <a:picLocks noGrp="1" noChangeAspect="1"/>
+          </p:cNvPicPr>
           <p:nvPr>
             <p:ph idx="1"/>
           </p:nvPr>
-        </p:nvSpPr>
-        <p:spPr/>
-        <p:txBody>
-          <a:bodyPr/>
+        </p:nvPicPr>
+        <p:blipFill>
+          <a:blip r:embed="rId2">
+            <a:extLst>
+              <a:ext uri="{28A0092B-C50C-407E-A947-70E740481C1C}">
+                <a14:useLocalDpi xmlns:a14="http://schemas.microsoft.com/office/drawing/2010/main" val="0"/>
+              </a:ext>
+            </a:extLst>
+          </a:blip>
+          <a:stretch>
+            <a:fillRect/>
+          </a:stretch>
+        </p:blipFill>
+        <p:spPr>
+          <a:xfrm>
+            <a:off x="2785600" y="1690688"/>
+            <a:ext cx="6620799" cy="2448267"/>
+          </a:xfrm>
+        </p:spPr>
+      </p:pic>
+      <p:sp>
+        <p:nvSpPr>
+          <p:cNvPr id="7" name="TextBox 6">
+            <a:extLst>
+              <a:ext uri="{FF2B5EF4-FFF2-40B4-BE49-F238E27FC236}">
+                <a16:creationId xmlns:a16="http://schemas.microsoft.com/office/drawing/2014/main" id="{F02D071F-AA99-4D7F-A54E-E2C18DEE2F4C}"/>
+              </a:ext>
+            </a:extLst>
+          </p:cNvPr>
+          <p:cNvSpPr txBox="1"/>
+          <p:nvPr/>
+        </p:nvSpPr>
+        <p:spPr>
+          <a:xfrm>
+            <a:off x="2235200" y="4329854"/>
+            <a:ext cx="7545493" cy="1477328"/>
+          </a:xfrm>
+          <a:prstGeom prst="rect">
+            <a:avLst/>
+          </a:prstGeom>
+          <a:noFill/>
+        </p:spPr>
+        <p:txBody>
+          <a:bodyPr wrap="square" rtlCol="0">
+            <a:spAutoFit/>
+          </a:bodyPr>
           <a:lstStyle/>
           <a:p>
             <a:r>
               <a:rPr lang="en-US" dirty="0"/>
-              <a:t>Took 20000 Bootstrap samples of size 200  from our original sample of 226 shows for each season.  Corresponding season 1 and season 2 values were not picked.  </a:t>
-            </a:r>
-            <a:r>
-              <a:rPr lang="en-US" dirty="0" err="1"/>
-              <a:t>I.e</a:t>
-            </a:r>
+              <a:t>We do not find statistically Significant evidence of a difference in population mean rating between first and second seasons of tv shows.  </a:t>
+            </a:r>
+          </a:p>
+          <a:p>
+            <a:endParaRPr lang="en-US" dirty="0"/>
+          </a:p>
+          <a:p>
             <a:r>
               <a:rPr lang="en-US" dirty="0"/>
-              <a:t> they were not sampled in pairs.  They were sampled separately with replacement.  This means that the sample taken for season 1 is independent here from the sample taken for season 2.</a:t>
-            </a:r>
-          </a:p>
-          <a:p>
-            <a:r>
-              <a:rPr lang="en-US" dirty="0"/>
-              <a:t>Since the season 1 values in the boot strap samples were gathered independently from the season 2 values, we should no longer be in violation of the independence assumption for a two-sample t test.</a:t>
-            </a:r>
+              <a:t>It could be worth trying to run this analysis again in the future if we have a larger pool of data than </a:t>
+            </a:r>
+            <a:r>
+              <a:rPr lang="en-US"/>
+              <a:t>226 observations.</a:t>
+            </a:r>
+            <a:endParaRPr lang="en-US" dirty="0"/>
           </a:p>
         </p:txBody>
       </p:sp>
     </p:spTree>
     <p:extLst>
       <p:ext uri="{BB962C8B-B14F-4D97-AF65-F5344CB8AC3E}">
-        <p14:creationId xmlns:p14="http://schemas.microsoft.com/office/powerpoint/2010/main" val="2239259575"/>
+        <p14:creationId xmlns:p14="http://schemas.microsoft.com/office/powerpoint/2010/main" val="1210001283"/>
       </p:ext>
     </p:extLst>
   </p:cSld>
@@ -3890,7 +3933,7 @@
           <p:cNvPr id="2" name="Title 1">
             <a:extLst>
               <a:ext uri="{FF2B5EF4-FFF2-40B4-BE49-F238E27FC236}">
-                <a16:creationId xmlns:a16="http://schemas.microsoft.com/office/drawing/2014/main" id="{E1351F20-6604-4E64-90BE-2354F967EFA0}"/>
+                <a16:creationId xmlns:a16="http://schemas.microsoft.com/office/drawing/2014/main" id="{AAD67D5E-5D5C-4328-A672-6942E13EA394}"/>
               </a:ext>
             </a:extLst>
           </p:cNvPr>
@@ -3908,7 +3951,7 @@
           <a:p>
             <a:r>
               <a:rPr lang="en-US" dirty="0"/>
-              <a:t>Bootstrap Sampling Cont.</a:t>
+              <a:t>Bootstrap Sampling</a:t>
             </a:r>
           </a:p>
         </p:txBody>
@@ -3918,7 +3961,7 @@
           <p:cNvPr id="3" name="Content Placeholder 2">
             <a:extLst>
               <a:ext uri="{FF2B5EF4-FFF2-40B4-BE49-F238E27FC236}">
-                <a16:creationId xmlns:a16="http://schemas.microsoft.com/office/drawing/2014/main" id="{D2FDC841-B9ED-43C0-9CF4-4DC2F6313E29}"/>
+                <a16:creationId xmlns:a16="http://schemas.microsoft.com/office/drawing/2014/main" id="{BCDBEC09-12C4-4523-9DB1-90D0E2CF9F1B}"/>
               </a:ext>
             </a:extLst>
           </p:cNvPr>
@@ -3936,29 +3979,21 @@
           <a:p>
             <a:r>
               <a:rPr lang="en-US" dirty="0"/>
-              <a:t>Mean p </a:t>
+              <a:t>Took 20000 Bootstrap samples of size 200  from our original sample of 226 shows for each season.  Corresponding season 1 and season 2 values were not picked.  </a:t>
             </a:r>
             <a:r>
               <a:rPr lang="en-US" dirty="0" err="1"/>
-              <a:t>val</a:t>
+              <a:t>I.e</a:t>
             </a:r>
             <a:r>
               <a:rPr lang="en-US" dirty="0"/>
-              <a:t> from 20000 two-sample t-tests on bootstrap samples was .427 (.30).  This seems substantially lower than our original calculated p </a:t>
-            </a:r>
-            <a:r>
-              <a:rPr lang="en-US" dirty="0" err="1"/>
-              <a:t>val</a:t>
-            </a:r>
+              <a:t> they were not sampled in pairs.  They were sampled separately with replacement.  This means that the sample taken for season 1 is independent here from the sample taken for season 2.</a:t>
+            </a:r>
+          </a:p>
+          <a:p>
             <a:r>
               <a:rPr lang="en-US" dirty="0"/>
-              <a:t> of .462.</a:t>
-            </a:r>
-          </a:p>
-          <a:p>
-            <a:r>
-              <a:rPr lang="en-US" dirty="0"/>
-              <a:t> Still no statistically significant evidence of difference in population means between season 1 and season 2, so our interpretation of the results does not change.</a:t>
+              <a:t>Since the season 1 values in the boot strap samples were gathered independently from the season 2 values, we should no longer be in violation of the independence assumption for a two-sample t test.</a:t>
             </a:r>
           </a:p>
         </p:txBody>
@@ -3966,7 +4001,7 @@
     </p:spTree>
     <p:extLst>
       <p:ext uri="{BB962C8B-B14F-4D97-AF65-F5344CB8AC3E}">
-        <p14:creationId xmlns:p14="http://schemas.microsoft.com/office/powerpoint/2010/main" val="3568464628"/>
+        <p14:creationId xmlns:p14="http://schemas.microsoft.com/office/powerpoint/2010/main" val="2239259575"/>
       </p:ext>
     </p:extLst>
   </p:cSld>
@@ -3998,6 +4033,114 @@
           <p:cNvPr id="2" name="Title 1">
             <a:extLst>
               <a:ext uri="{FF2B5EF4-FFF2-40B4-BE49-F238E27FC236}">
+                <a16:creationId xmlns:a16="http://schemas.microsoft.com/office/drawing/2014/main" id="{E1351F20-6604-4E64-90BE-2354F967EFA0}"/>
+              </a:ext>
+            </a:extLst>
+          </p:cNvPr>
+          <p:cNvSpPr>
+            <a:spLocks noGrp="1"/>
+          </p:cNvSpPr>
+          <p:nvPr>
+            <p:ph type="title"/>
+          </p:nvPr>
+        </p:nvSpPr>
+        <p:spPr/>
+        <p:txBody>
+          <a:bodyPr/>
+          <a:lstStyle/>
+          <a:p>
+            <a:r>
+              <a:rPr lang="en-US" dirty="0"/>
+              <a:t>Bootstrap Sampling Cont.</a:t>
+            </a:r>
+          </a:p>
+        </p:txBody>
+      </p:sp>
+      <p:sp>
+        <p:nvSpPr>
+          <p:cNvPr id="3" name="Content Placeholder 2">
+            <a:extLst>
+              <a:ext uri="{FF2B5EF4-FFF2-40B4-BE49-F238E27FC236}">
+                <a16:creationId xmlns:a16="http://schemas.microsoft.com/office/drawing/2014/main" id="{D2FDC841-B9ED-43C0-9CF4-4DC2F6313E29}"/>
+              </a:ext>
+            </a:extLst>
+          </p:cNvPr>
+          <p:cNvSpPr>
+            <a:spLocks noGrp="1"/>
+          </p:cNvSpPr>
+          <p:nvPr>
+            <p:ph idx="1"/>
+          </p:nvPr>
+        </p:nvSpPr>
+        <p:spPr/>
+        <p:txBody>
+          <a:bodyPr/>
+          <a:lstStyle/>
+          <a:p>
+            <a:r>
+              <a:rPr lang="en-US" dirty="0"/>
+              <a:t>Mean p </a:t>
+            </a:r>
+            <a:r>
+              <a:rPr lang="en-US" dirty="0" err="1"/>
+              <a:t>val</a:t>
+            </a:r>
+            <a:r>
+              <a:rPr lang="en-US" dirty="0"/>
+              <a:t> from 20000 two-sample t-tests on bootstrap samples was .427 (.30).  This seems substantially lower than our original calculated p </a:t>
+            </a:r>
+            <a:r>
+              <a:rPr lang="en-US" dirty="0" err="1"/>
+              <a:t>val</a:t>
+            </a:r>
+            <a:r>
+              <a:rPr lang="en-US" dirty="0"/>
+              <a:t> of .462.</a:t>
+            </a:r>
+          </a:p>
+          <a:p>
+            <a:r>
+              <a:rPr lang="en-US" dirty="0"/>
+              <a:t> Still no statistically significant evidence of difference in population means between season 1 and season 2, so our interpretation of the results does not change.</a:t>
+            </a:r>
+          </a:p>
+        </p:txBody>
+      </p:sp>
+    </p:spTree>
+    <p:extLst>
+      <p:ext uri="{BB962C8B-B14F-4D97-AF65-F5344CB8AC3E}">
+        <p14:creationId xmlns:p14="http://schemas.microsoft.com/office/powerpoint/2010/main" val="3568464628"/>
+      </p:ext>
+    </p:extLst>
+  </p:cSld>
+  <p:clrMapOvr>
+    <a:masterClrMapping/>
+  </p:clrMapOvr>
+</p:sld>
+</file>
+
+<file path=ppt/slides/slide13.xml><?xml version="1.0" encoding="utf-8"?>
+<p:sld xmlns:a="http://schemas.openxmlformats.org/drawingml/2006/main" xmlns:r="http://schemas.openxmlformats.org/officeDocument/2006/relationships" xmlns:p="http://schemas.openxmlformats.org/presentationml/2006/main">
+  <p:cSld>
+    <p:spTree>
+      <p:nvGrpSpPr>
+        <p:cNvPr id="1" name=""/>
+        <p:cNvGrpSpPr/>
+        <p:nvPr/>
+      </p:nvGrpSpPr>
+      <p:grpSpPr>
+        <a:xfrm>
+          <a:off x="0" y="0"/>
+          <a:ext cx="0" cy="0"/>
+          <a:chOff x="0" y="0"/>
+          <a:chExt cx="0" cy="0"/>
+        </a:xfrm>
+      </p:grpSpPr>
+      <p:sp>
+        <p:nvSpPr>
+          <p:cNvPr id="2" name="Title 1">
+            <a:extLst>
+              <a:ext uri="{FF2B5EF4-FFF2-40B4-BE49-F238E27FC236}">
                 <a16:creationId xmlns:a16="http://schemas.microsoft.com/office/drawing/2014/main" id="{7499F57B-C6F3-45F4-98BB-5B6882C5F274}"/>
               </a:ext>
             </a:extLst>
@@ -4109,7 +4252,7 @@
 </p:sld>
 </file>
 
-<file path=ppt/slides/slide13.xml><?xml version="1.0" encoding="utf-8"?>
+<file path=ppt/slides/slide14.xml><?xml version="1.0" encoding="utf-8"?>
 <p:sld xmlns:a="http://schemas.openxmlformats.org/drawingml/2006/main" xmlns:r="http://schemas.openxmlformats.org/officeDocument/2006/relationships" xmlns:p="http://schemas.openxmlformats.org/presentationml/2006/main">
   <p:cSld>
     <p:spTree>
@@ -4847,6 +4990,211 @@
           <p:cNvPr id="2" name="Title 1">
             <a:extLst>
               <a:ext uri="{FF2B5EF4-FFF2-40B4-BE49-F238E27FC236}">
+                <a16:creationId xmlns:a16="http://schemas.microsoft.com/office/drawing/2014/main" id="{FC29CCB5-8257-4BDC-AF43-327DEC6BA5CD}"/>
+              </a:ext>
+            </a:extLst>
+          </p:cNvPr>
+          <p:cNvSpPr>
+            <a:spLocks noGrp="1"/>
+          </p:cNvSpPr>
+          <p:nvPr>
+            <p:ph type="title"/>
+          </p:nvPr>
+        </p:nvSpPr>
+        <p:spPr/>
+        <p:txBody>
+          <a:bodyPr/>
+          <a:lstStyle/>
+          <a:p>
+            <a:r>
+              <a:rPr lang="en-US" dirty="0"/>
+              <a:t>Exploratory Analysis Cont.</a:t>
+            </a:r>
+            <a:endParaRPr lang="en-IN" dirty="0"/>
+          </a:p>
+        </p:txBody>
+      </p:sp>
+      <p:pic>
+        <p:nvPicPr>
+          <p:cNvPr id="5" name="Content Placeholder 4" descr="Chart, pie chart&#10;&#10;Description automatically generated">
+            <a:extLst>
+              <a:ext uri="{FF2B5EF4-FFF2-40B4-BE49-F238E27FC236}">
+                <a16:creationId xmlns:a16="http://schemas.microsoft.com/office/drawing/2014/main" id="{F74E6C28-A5EB-4DD6-96FB-0C78444B7525}"/>
+              </a:ext>
+            </a:extLst>
+          </p:cNvPr>
+          <p:cNvPicPr>
+            <a:picLocks noGrp="1" noChangeAspect="1"/>
+          </p:cNvPicPr>
+          <p:nvPr>
+            <p:ph idx="1"/>
+          </p:nvPr>
+        </p:nvPicPr>
+        <p:blipFill>
+          <a:blip r:embed="rId2">
+            <a:extLst>
+              <a:ext uri="{28A0092B-C50C-407E-A947-70E740481C1C}">
+                <a14:useLocalDpi xmlns:a14="http://schemas.microsoft.com/office/drawing/2010/main" val="0"/>
+              </a:ext>
+            </a:extLst>
+          </a:blip>
+          <a:stretch>
+            <a:fillRect/>
+          </a:stretch>
+        </p:blipFill>
+        <p:spPr>
+          <a:xfrm>
+            <a:off x="992848" y="1946175"/>
+            <a:ext cx="4058687" cy="4023701"/>
+          </a:xfrm>
+        </p:spPr>
+      </p:pic>
+      <p:pic>
+        <p:nvPicPr>
+          <p:cNvPr id="9" name="Picture 8" descr="Chart, pie chart&#10;&#10;Description automatically generated">
+            <a:extLst>
+              <a:ext uri="{FF2B5EF4-FFF2-40B4-BE49-F238E27FC236}">
+                <a16:creationId xmlns:a16="http://schemas.microsoft.com/office/drawing/2014/main" id="{541C8F3E-A81B-4C6A-A4F6-0FB3B3870F8A}"/>
+              </a:ext>
+            </a:extLst>
+          </p:cNvPr>
+          <p:cNvPicPr>
+            <a:picLocks noChangeAspect="1"/>
+          </p:cNvPicPr>
+          <p:nvPr/>
+        </p:nvPicPr>
+        <p:blipFill>
+          <a:blip r:embed="rId3">
+            <a:extLst>
+              <a:ext uri="{28A0092B-C50C-407E-A947-70E740481C1C}">
+                <a14:useLocalDpi xmlns:a14="http://schemas.microsoft.com/office/drawing/2010/main" val="0"/>
+              </a:ext>
+            </a:extLst>
+          </a:blip>
+          <a:stretch>
+            <a:fillRect/>
+          </a:stretch>
+        </p:blipFill>
+        <p:spPr>
+          <a:xfrm>
+            <a:off x="6096000" y="1812981"/>
+            <a:ext cx="4193039" cy="4156895"/>
+          </a:xfrm>
+          <a:prstGeom prst="rect">
+            <a:avLst/>
+          </a:prstGeom>
+        </p:spPr>
+      </p:pic>
+      <p:sp>
+        <p:nvSpPr>
+          <p:cNvPr id="11" name="TextBox 10">
+            <a:extLst>
+              <a:ext uri="{FF2B5EF4-FFF2-40B4-BE49-F238E27FC236}">
+                <a16:creationId xmlns:a16="http://schemas.microsoft.com/office/drawing/2014/main" id="{93A94A85-AB06-4398-88FB-FA1E2BEEEAE3}"/>
+              </a:ext>
+            </a:extLst>
+          </p:cNvPr>
+          <p:cNvSpPr txBox="1"/>
+          <p:nvPr/>
+        </p:nvSpPr>
+        <p:spPr>
+          <a:xfrm>
+            <a:off x="1257008" y="6225363"/>
+            <a:ext cx="3314992" cy="369332"/>
+          </a:xfrm>
+          <a:prstGeom prst="rect">
+            <a:avLst/>
+          </a:prstGeom>
+          <a:noFill/>
+        </p:spPr>
+        <p:txBody>
+          <a:bodyPr wrap="square" rtlCol="0">
+            <a:spAutoFit/>
+          </a:bodyPr>
+          <a:lstStyle/>
+          <a:p>
+            <a:r>
+              <a:rPr lang="en-US" dirty="0"/>
+              <a:t>Season-1 Pie Chart for Avg ratings</a:t>
+            </a:r>
+            <a:endParaRPr lang="en-IN" dirty="0"/>
+          </a:p>
+        </p:txBody>
+      </p:sp>
+      <p:sp>
+        <p:nvSpPr>
+          <p:cNvPr id="16" name="TextBox 15">
+            <a:extLst>
+              <a:ext uri="{FF2B5EF4-FFF2-40B4-BE49-F238E27FC236}">
+                <a16:creationId xmlns:a16="http://schemas.microsoft.com/office/drawing/2014/main" id="{E8CB62BA-9B6D-405D-BB58-E451A59B33E9}"/>
+              </a:ext>
+            </a:extLst>
+          </p:cNvPr>
+          <p:cNvSpPr txBox="1"/>
+          <p:nvPr/>
+        </p:nvSpPr>
+        <p:spPr>
+          <a:xfrm>
+            <a:off x="6390640" y="6217920"/>
+            <a:ext cx="3576320" cy="646331"/>
+          </a:xfrm>
+          <a:prstGeom prst="rect">
+            <a:avLst/>
+          </a:prstGeom>
+          <a:noFill/>
+        </p:spPr>
+        <p:txBody>
+          <a:bodyPr wrap="square" rtlCol="0">
+            <a:spAutoFit/>
+          </a:bodyPr>
+          <a:lstStyle/>
+          <a:p>
+            <a:r>
+              <a:rPr lang="en-US" dirty="0"/>
+              <a:t>Season-2 Pie Chart for Avg ratings</a:t>
+            </a:r>
+            <a:endParaRPr lang="en-IN" dirty="0"/>
+          </a:p>
+          <a:p>
+            <a:endParaRPr lang="en-IN" dirty="0"/>
+          </a:p>
+        </p:txBody>
+      </p:sp>
+    </p:spTree>
+    <p:extLst>
+      <p:ext uri="{BB962C8B-B14F-4D97-AF65-F5344CB8AC3E}">
+        <p14:creationId xmlns:p14="http://schemas.microsoft.com/office/powerpoint/2010/main" val="3289608887"/>
+      </p:ext>
+    </p:extLst>
+  </p:cSld>
+  <p:clrMapOvr>
+    <a:masterClrMapping/>
+  </p:clrMapOvr>
+</p:sld>
+</file>
+
+<file path=ppt/slides/slide8.xml><?xml version="1.0" encoding="utf-8"?>
+<p:sld xmlns:a="http://schemas.openxmlformats.org/drawingml/2006/main" xmlns:r="http://schemas.openxmlformats.org/officeDocument/2006/relationships" xmlns:p="http://schemas.openxmlformats.org/presentationml/2006/main">
+  <p:cSld>
+    <p:spTree>
+      <p:nvGrpSpPr>
+        <p:cNvPr id="1" name=""/>
+        <p:cNvGrpSpPr/>
+        <p:nvPr/>
+      </p:nvGrpSpPr>
+      <p:grpSpPr>
+        <a:xfrm>
+          <a:off x="0" y="0"/>
+          <a:ext cx="0" cy="0"/>
+          <a:chOff x="0" y="0"/>
+          <a:chExt cx="0" cy="0"/>
+        </a:xfrm>
+      </p:grpSpPr>
+      <p:sp>
+        <p:nvSpPr>
+          <p:cNvPr id="2" name="Title 1">
+            <a:extLst>
+              <a:ext uri="{FF2B5EF4-FFF2-40B4-BE49-F238E27FC236}">
                 <a16:creationId xmlns:a16="http://schemas.microsoft.com/office/drawing/2014/main" id="{9E5DFA6D-CD51-4530-A0A4-309DA1A83038}"/>
               </a:ext>
             </a:extLst>
@@ -5004,7 +5352,7 @@
 </p:sld>
 </file>
 
-<file path=ppt/slides/slide8.xml><?xml version="1.0" encoding="utf-8"?>
+<file path=ppt/slides/slide9.xml><?xml version="1.0" encoding="utf-8"?>
 <p:sld xmlns:a="http://schemas.openxmlformats.org/drawingml/2006/main" xmlns:r="http://schemas.openxmlformats.org/officeDocument/2006/relationships" xmlns:p="http://schemas.openxmlformats.org/presentationml/2006/main">
   <p:cSld>
     <p:spTree>
@@ -5189,148 +5537,6 @@
     <p:extLst>
       <p:ext uri="{BB962C8B-B14F-4D97-AF65-F5344CB8AC3E}">
         <p14:creationId xmlns:p14="http://schemas.microsoft.com/office/powerpoint/2010/main" val="263045210"/>
-      </p:ext>
-    </p:extLst>
-  </p:cSld>
-  <p:clrMapOvr>
-    <a:masterClrMapping/>
-  </p:clrMapOvr>
-</p:sld>
-</file>
-
-<file path=ppt/slides/slide9.xml><?xml version="1.0" encoding="utf-8"?>
-<p:sld xmlns:a="http://schemas.openxmlformats.org/drawingml/2006/main" xmlns:r="http://schemas.openxmlformats.org/officeDocument/2006/relationships" xmlns:p="http://schemas.openxmlformats.org/presentationml/2006/main">
-  <p:cSld>
-    <p:spTree>
-      <p:nvGrpSpPr>
-        <p:cNvPr id="1" name=""/>
-        <p:cNvGrpSpPr/>
-        <p:nvPr/>
-      </p:nvGrpSpPr>
-      <p:grpSpPr>
-        <a:xfrm>
-          <a:off x="0" y="0"/>
-          <a:ext cx="0" cy="0"/>
-          <a:chOff x="0" y="0"/>
-          <a:chExt cx="0" cy="0"/>
-        </a:xfrm>
-      </p:grpSpPr>
-      <p:sp>
-        <p:nvSpPr>
-          <p:cNvPr id="2" name="Title 1">
-            <a:extLst>
-              <a:ext uri="{FF2B5EF4-FFF2-40B4-BE49-F238E27FC236}">
-                <a16:creationId xmlns:a16="http://schemas.microsoft.com/office/drawing/2014/main" id="{E901A6C3-F72A-497A-8E3E-CEF2E243711C}"/>
-              </a:ext>
-            </a:extLst>
-          </p:cNvPr>
-          <p:cNvSpPr>
-            <a:spLocks noGrp="1"/>
-          </p:cNvSpPr>
-          <p:nvPr>
-            <p:ph type="title"/>
-          </p:nvPr>
-        </p:nvSpPr>
-        <p:spPr/>
-        <p:txBody>
-          <a:bodyPr/>
-          <a:lstStyle/>
-          <a:p>
-            <a:r>
-              <a:rPr lang="en-US" dirty="0"/>
-              <a:t>Two-Sample T Test Results</a:t>
-            </a:r>
-          </a:p>
-        </p:txBody>
-      </p:sp>
-      <p:pic>
-        <p:nvPicPr>
-          <p:cNvPr id="6" name="Content Placeholder 5" descr="Text, letter&#10;&#10;Description automatically generated">
-            <a:extLst>
-              <a:ext uri="{FF2B5EF4-FFF2-40B4-BE49-F238E27FC236}">
-                <a16:creationId xmlns:a16="http://schemas.microsoft.com/office/drawing/2014/main" id="{0CAA84E1-555A-4572-936B-19299817F9C9}"/>
-              </a:ext>
-            </a:extLst>
-          </p:cNvPr>
-          <p:cNvPicPr>
-            <a:picLocks noGrp="1" noChangeAspect="1"/>
-          </p:cNvPicPr>
-          <p:nvPr>
-            <p:ph idx="1"/>
-          </p:nvPr>
-        </p:nvPicPr>
-        <p:blipFill>
-          <a:blip r:embed="rId2">
-            <a:extLst>
-              <a:ext uri="{28A0092B-C50C-407E-A947-70E740481C1C}">
-                <a14:useLocalDpi xmlns:a14="http://schemas.microsoft.com/office/drawing/2010/main" val="0"/>
-              </a:ext>
-            </a:extLst>
-          </a:blip>
-          <a:stretch>
-            <a:fillRect/>
-          </a:stretch>
-        </p:blipFill>
-        <p:spPr>
-          <a:xfrm>
-            <a:off x="2785600" y="1690688"/>
-            <a:ext cx="6620799" cy="2448267"/>
-          </a:xfrm>
-        </p:spPr>
-      </p:pic>
-      <p:sp>
-        <p:nvSpPr>
-          <p:cNvPr id="7" name="TextBox 6">
-            <a:extLst>
-              <a:ext uri="{FF2B5EF4-FFF2-40B4-BE49-F238E27FC236}">
-                <a16:creationId xmlns:a16="http://schemas.microsoft.com/office/drawing/2014/main" id="{F02D071F-AA99-4D7F-A54E-E2C18DEE2F4C}"/>
-              </a:ext>
-            </a:extLst>
-          </p:cNvPr>
-          <p:cNvSpPr txBox="1"/>
-          <p:nvPr/>
-        </p:nvSpPr>
-        <p:spPr>
-          <a:xfrm>
-            <a:off x="2235200" y="4329854"/>
-            <a:ext cx="7545493" cy="1477328"/>
-          </a:xfrm>
-          <a:prstGeom prst="rect">
-            <a:avLst/>
-          </a:prstGeom>
-          <a:noFill/>
-        </p:spPr>
-        <p:txBody>
-          <a:bodyPr wrap="square" rtlCol="0">
-            <a:spAutoFit/>
-          </a:bodyPr>
-          <a:lstStyle/>
-          <a:p>
-            <a:r>
-              <a:rPr lang="en-US" dirty="0"/>
-              <a:t>We do not find statistically Significant evidence of a difference in population mean rating between first and second seasons of tv shows.  </a:t>
-            </a:r>
-          </a:p>
-          <a:p>
-            <a:endParaRPr lang="en-US" dirty="0"/>
-          </a:p>
-          <a:p>
-            <a:r>
-              <a:rPr lang="en-US" dirty="0"/>
-              <a:t>It could be worth trying to run this analysis again in the future if we have a larger pool of data than </a:t>
-            </a:r>
-            <a:r>
-              <a:rPr lang="en-US"/>
-              <a:t>226 observations.</a:t>
-            </a:r>
-            <a:endParaRPr lang="en-US" dirty="0"/>
-          </a:p>
-        </p:txBody>
-      </p:sp>
-    </p:spTree>
-    <p:extLst>
-      <p:ext uri="{BB962C8B-B14F-4D97-AF65-F5344CB8AC3E}">
-        <p14:creationId xmlns:p14="http://schemas.microsoft.com/office/powerpoint/2010/main" val="1210001283"/>
       </p:ext>
     </p:extLst>
   </p:cSld>

</xml_diff>